<commit_message>
Updated with Cloud Friday Intro
</commit_message>
<xml_diff>
--- a/content/DEVOPS, SRE, Azure Boards/0. Introduction.pptx
+++ b/content/DEVOPS, SRE, Azure Boards/0. Introduction.pptx
@@ -11,6 +11,8 @@
     <p:sldId id="259" r:id="rId5"/>
     <p:sldId id="260" r:id="rId6"/>
     <p:sldId id="258" r:id="rId7"/>
+    <p:sldId id="635" r:id="rId8"/>
+    <p:sldId id="636" r:id="rId9"/>
   </p:sldIdLst>
   <p:sldSz cx="12192000" cy="6858000"/>
   <p:notesSz cx="6858000" cy="9144000"/>
@@ -266,7 +268,7 @@
           <a:p>
             <a:fld id="{766927D6-957D-304E-8ACA-BA097D129572}" type="datetimeFigureOut">
               <a:rPr lang="en-US" smtClean="0"/>
-              <a:t>4/16/20</a:t>
+              <a:t>4/17/20</a:t>
             </a:fld>
             <a:endParaRPr lang="en-US"/>
           </a:p>
@@ -466,7 +468,7 @@
           <a:p>
             <a:fld id="{766927D6-957D-304E-8ACA-BA097D129572}" type="datetimeFigureOut">
               <a:rPr lang="en-US" smtClean="0"/>
-              <a:t>4/16/20</a:t>
+              <a:t>4/17/20</a:t>
             </a:fld>
             <a:endParaRPr lang="en-US"/>
           </a:p>
@@ -676,7 +678,7 @@
           <a:p>
             <a:fld id="{766927D6-957D-304E-8ACA-BA097D129572}" type="datetimeFigureOut">
               <a:rPr lang="en-US" smtClean="0"/>
-              <a:t>4/16/20</a:t>
+              <a:t>4/17/20</a:t>
             </a:fld>
             <a:endParaRPr lang="en-US"/>
           </a:p>
@@ -876,7 +878,7 @@
           <a:p>
             <a:fld id="{766927D6-957D-304E-8ACA-BA097D129572}" type="datetimeFigureOut">
               <a:rPr lang="en-US" smtClean="0"/>
-              <a:t>4/16/20</a:t>
+              <a:t>4/17/20</a:t>
             </a:fld>
             <a:endParaRPr lang="en-US"/>
           </a:p>
@@ -1182,7 +1184,7 @@
           <a:p>
             <a:fld id="{766927D6-957D-304E-8ACA-BA097D129572}" type="datetimeFigureOut">
               <a:rPr lang="en-US" smtClean="0"/>
-              <a:t>4/16/20</a:t>
+              <a:t>4/17/20</a:t>
             </a:fld>
             <a:endParaRPr lang="en-US"/>
           </a:p>
@@ -1450,7 +1452,7 @@
           <a:p>
             <a:fld id="{766927D6-957D-304E-8ACA-BA097D129572}" type="datetimeFigureOut">
               <a:rPr lang="en-US" smtClean="0"/>
-              <a:t>4/16/20</a:t>
+              <a:t>4/17/20</a:t>
             </a:fld>
             <a:endParaRPr lang="en-US"/>
           </a:p>
@@ -1865,7 +1867,7 @@
           <a:p>
             <a:fld id="{766927D6-957D-304E-8ACA-BA097D129572}" type="datetimeFigureOut">
               <a:rPr lang="en-US" smtClean="0"/>
-              <a:t>4/16/20</a:t>
+              <a:t>4/17/20</a:t>
             </a:fld>
             <a:endParaRPr lang="en-US"/>
           </a:p>
@@ -2007,7 +2009,7 @@
           <a:p>
             <a:fld id="{766927D6-957D-304E-8ACA-BA097D129572}" type="datetimeFigureOut">
               <a:rPr lang="en-US" smtClean="0"/>
-              <a:t>4/16/20</a:t>
+              <a:t>4/17/20</a:t>
             </a:fld>
             <a:endParaRPr lang="en-US"/>
           </a:p>
@@ -2120,7 +2122,7 @@
           <a:p>
             <a:fld id="{766927D6-957D-304E-8ACA-BA097D129572}" type="datetimeFigureOut">
               <a:rPr lang="en-US" smtClean="0"/>
-              <a:t>4/16/20</a:t>
+              <a:t>4/17/20</a:t>
             </a:fld>
             <a:endParaRPr lang="en-US"/>
           </a:p>
@@ -2433,7 +2435,7 @@
           <a:p>
             <a:fld id="{766927D6-957D-304E-8ACA-BA097D129572}" type="datetimeFigureOut">
               <a:rPr lang="en-US" smtClean="0"/>
-              <a:t>4/16/20</a:t>
+              <a:t>4/17/20</a:t>
             </a:fld>
             <a:endParaRPr lang="en-US"/>
           </a:p>
@@ -2722,7 +2724,7 @@
           <a:p>
             <a:fld id="{766927D6-957D-304E-8ACA-BA097D129572}" type="datetimeFigureOut">
               <a:rPr lang="en-US" smtClean="0"/>
-              <a:t>4/16/20</a:t>
+              <a:t>4/17/20</a:t>
             </a:fld>
             <a:endParaRPr lang="en-US"/>
           </a:p>
@@ -2965,7 +2967,7 @@
           <a:p>
             <a:fld id="{766927D6-957D-304E-8ACA-BA097D129572}" type="datetimeFigureOut">
               <a:rPr lang="en-US" smtClean="0"/>
-              <a:t>4/16/20</a:t>
+              <a:t>4/17/20</a:t>
             </a:fld>
             <a:endParaRPr lang="en-US"/>
           </a:p>
@@ -4501,7 +4503,7 @@
                 </a:solidFill>
                 <a:latin typeface="Graphik Meetup"/>
               </a:rPr>
-              <a:t>09:15 - 10:00 - </a:t>
+              <a:t>09:25 - 10:20- </a:t>
             </a:r>
             <a:r>
               <a:rPr lang="en-ZA" dirty="0"/>
@@ -4540,7 +4542,7 @@
                 </a:solidFill>
                 <a:latin typeface="Graphik Meetup"/>
               </a:rPr>
-              <a:t>10:15 - 11:00 - </a:t>
+              <a:t>10:30 - 11:15 - </a:t>
             </a:r>
             <a:r>
               <a:rPr lang="en-ZA" dirty="0"/>
@@ -4571,7 +4573,7 @@
                 </a:solidFill>
                 <a:latin typeface="Graphik Meetup"/>
               </a:rPr>
-              <a:t>11:15 - 12:00 - </a:t>
+              <a:t>11:30 - 12:15 - </a:t>
             </a:r>
             <a:r>
               <a:rPr lang="en-ZA" dirty="0"/>
@@ -4611,9 +4613,119 @@
                 </a:solidFill>
                 <a:latin typeface="Graphik Meetup"/>
               </a:rPr>
-              <a:t>12:00 - 13:00: Panel Q&amp;A and LUNCH!</a:t>
+              <a:t>12:00 - 13:00: Panel Q&amp;A</a:t>
             </a:r>
             <a:endParaRPr lang="en-US" dirty="0"/>
+          </a:p>
+        </p:txBody>
+      </p:sp>
+      <p:sp>
+        <p:nvSpPr>
+          <p:cNvPr id="4" name="Rectangle 3">
+            <a:extLst>
+              <a:ext uri="{FF2B5EF4-FFF2-40B4-BE49-F238E27FC236}">
+                <a16:creationId xmlns:a16="http://schemas.microsoft.com/office/drawing/2014/main" id="{97F90427-5403-1442-9C6C-0A2580F6D7EF}"/>
+              </a:ext>
+            </a:extLst>
+          </p:cNvPr>
+          <p:cNvSpPr/>
+          <p:nvPr/>
+        </p:nvSpPr>
+        <p:spPr>
+          <a:xfrm>
+            <a:off x="2438401" y="4892085"/>
+            <a:ext cx="9568542" cy="609600"/>
+          </a:xfrm>
+          <a:prstGeom prst="rect">
+            <a:avLst/>
+          </a:prstGeom>
+          <a:noFill/>
+          <a:ln w="57150">
+            <a:solidFill>
+              <a:srgbClr val="FF0000"/>
+            </a:solidFill>
+          </a:ln>
+        </p:spPr>
+        <p:style>
+          <a:lnRef idx="2">
+            <a:schemeClr val="accent1">
+              <a:shade val="50000"/>
+            </a:schemeClr>
+          </a:lnRef>
+          <a:fillRef idx="1">
+            <a:schemeClr val="accent1"/>
+          </a:fillRef>
+          <a:effectRef idx="0">
+            <a:schemeClr val="accent1"/>
+          </a:effectRef>
+          <a:fontRef idx="minor">
+            <a:schemeClr val="lt1"/>
+          </a:fontRef>
+        </p:style>
+        <p:txBody>
+          <a:bodyPr rtlCol="0" anchor="ctr"/>
+          <a:lstStyle/>
+          <a:p>
+            <a:pPr algn="ctr"/>
+            <a:endParaRPr lang="en-US"/>
+          </a:p>
+        </p:txBody>
+      </p:sp>
+      <p:sp>
+        <p:nvSpPr>
+          <p:cNvPr id="9" name="Title 1">
+            <a:extLst>
+              <a:ext uri="{FF2B5EF4-FFF2-40B4-BE49-F238E27FC236}">
+                <a16:creationId xmlns:a16="http://schemas.microsoft.com/office/drawing/2014/main" id="{0501AF2A-1A45-D84C-ADC6-38607CD26FCD}"/>
+              </a:ext>
+            </a:extLst>
+          </p:cNvPr>
+          <p:cNvSpPr txBox="1">
+            <a:spLocks/>
+          </p:cNvSpPr>
+          <p:nvPr/>
+        </p:nvSpPr>
+        <p:spPr>
+          <a:xfrm>
+            <a:off x="2558143" y="4721610"/>
+            <a:ext cx="2131870" cy="942551"/>
+          </a:xfrm>
+          <a:prstGeom prst="rect">
+            <a:avLst/>
+          </a:prstGeom>
+        </p:spPr>
+        <p:txBody>
+          <a:bodyPr vert="horz" lIns="91440" tIns="45720" rIns="91440" bIns="45720" rtlCol="0" anchor="ctr">
+            <a:normAutofit/>
+          </a:bodyPr>
+          <a:lstStyle>
+            <a:lvl1pPr algn="l" defTabSz="914400" rtl="0" eaLnBrk="1" latinLnBrk="0" hangingPunct="1">
+              <a:lnSpc>
+                <a:spcPct val="90000"/>
+              </a:lnSpc>
+              <a:spcBef>
+                <a:spcPct val="0"/>
+              </a:spcBef>
+              <a:buNone/>
+              <a:defRPr sz="4400" kern="1200">
+                <a:solidFill>
+                  <a:schemeClr val="tx1"/>
+                </a:solidFill>
+                <a:latin typeface="+mj-lt"/>
+                <a:ea typeface="+mj-ea"/>
+                <a:cs typeface="+mj-cs"/>
+              </a:defRPr>
+            </a:lvl1pPr>
+          </a:lstStyle>
+          <a:p>
+            <a:r>
+              <a:rPr lang="en-US" dirty="0">
+                <a:solidFill>
+                  <a:srgbClr val="FF0000"/>
+                </a:solidFill>
+              </a:rPr>
+              <a:t>Up Next</a:t>
+            </a:r>
           </a:p>
         </p:txBody>
       </p:sp>
@@ -4621,6 +4733,645 @@
     <p:extLst>
       <p:ext uri="{BB962C8B-B14F-4D97-AF65-F5344CB8AC3E}">
         <p14:creationId xmlns:p14="http://schemas.microsoft.com/office/powerpoint/2010/main" val="260978856"/>
+      </p:ext>
+    </p:extLst>
+  </p:cSld>
+  <p:clrMapOvr>
+    <a:masterClrMapping/>
+  </p:clrMapOvr>
+</p:sld>
+</file>
+
+<file path=ppt/slides/slide7.xml><?xml version="1.0" encoding="utf-8"?>
+<p:sld xmlns:a="http://schemas.openxmlformats.org/drawingml/2006/main" xmlns:r="http://schemas.openxmlformats.org/officeDocument/2006/relationships" xmlns:p="http://schemas.openxmlformats.org/presentationml/2006/main">
+  <p:cSld>
+    <p:bg>
+      <p:bgPr>
+        <a:solidFill>
+          <a:schemeClr val="bg1"/>
+        </a:solidFill>
+        <a:effectLst/>
+      </p:bgPr>
+    </p:bg>
+    <p:spTree>
+      <p:nvGrpSpPr>
+        <p:cNvPr id="1" name=""/>
+        <p:cNvGrpSpPr/>
+        <p:nvPr/>
+      </p:nvGrpSpPr>
+      <p:grpSpPr>
+        <a:xfrm>
+          <a:off x="0" y="0"/>
+          <a:ext cx="0" cy="0"/>
+          <a:chOff x="0" y="0"/>
+          <a:chExt cx="0" cy="0"/>
+        </a:xfrm>
+      </p:grpSpPr>
+      <p:pic>
+        <p:nvPicPr>
+          <p:cNvPr id="6" name="Picture 5" descr="A close up of a logo&#10;&#10;Description automatically generated">
+            <a:extLst>
+              <a:ext uri="{FF2B5EF4-FFF2-40B4-BE49-F238E27FC236}">
+                <a16:creationId xmlns:a16="http://schemas.microsoft.com/office/drawing/2014/main" id="{73CBE624-5C37-334E-912D-FA83D40084F0}"/>
+              </a:ext>
+            </a:extLst>
+          </p:cNvPr>
+          <p:cNvPicPr>
+            <a:picLocks noChangeAspect="1"/>
+          </p:cNvPicPr>
+          <p:nvPr/>
+        </p:nvPicPr>
+        <p:blipFill>
+          <a:blip r:embed="rId2"/>
+          <a:stretch>
+            <a:fillRect/>
+          </a:stretch>
+        </p:blipFill>
+        <p:spPr>
+          <a:xfrm>
+            <a:off x="4762" y="128587"/>
+            <a:ext cx="12182475" cy="6858000"/>
+          </a:xfrm>
+          <a:prstGeom prst="rect">
+            <a:avLst/>
+          </a:prstGeom>
+        </p:spPr>
+      </p:pic>
+      <p:sp>
+        <p:nvSpPr>
+          <p:cNvPr id="17" name="Rectangle 16">
+            <a:extLst>
+              <a:ext uri="{FF2B5EF4-FFF2-40B4-BE49-F238E27FC236}">
+                <a16:creationId xmlns:a16="http://schemas.microsoft.com/office/drawing/2014/main" id="{68575C10-8187-4AC4-AD72-C754EAFD2867}"/>
+              </a:ext>
+              <a:ext uri="{C183D7F6-B498-43B3-948B-1728B52AA6E4}">
+                <adec:decorative xmlns:adec="http://schemas.microsoft.com/office/drawing/2017/decorative" val="1"/>
+              </a:ext>
+            </a:extLst>
+          </p:cNvPr>
+          <p:cNvSpPr>
+            <a:spLocks noGrp="1" noRot="1" noChangeAspect="1" noMove="1" noResize="1" noEditPoints="1" noAdjustHandles="1" noChangeArrowheads="1" noChangeShapeType="1" noTextEdit="1"/>
+          </p:cNvSpPr>
+          <p:nvPr>
+            <p:extLst>
+              <p:ext uri="{386F3935-93C4-4BCD-93E2-E3B085C9AB24}">
+                <p16:designElem xmlns:p16="http://schemas.microsoft.com/office/powerpoint/2015/main" val="1"/>
+              </p:ext>
+            </p:extLst>
+          </p:nvPr>
+        </p:nvSpPr>
+        <p:spPr>
+          <a:xfrm>
+            <a:off x="-1" y="0"/>
+            <a:ext cx="4654295" cy="6858000"/>
+          </a:xfrm>
+          <a:prstGeom prst="rect">
+            <a:avLst/>
+          </a:prstGeom>
+          <a:solidFill>
+            <a:schemeClr val="tx1"/>
+          </a:solidFill>
+          <a:ln>
+            <a:noFill/>
+          </a:ln>
+        </p:spPr>
+        <p:style>
+          <a:lnRef idx="2">
+            <a:schemeClr val="accent1">
+              <a:shade val="50000"/>
+            </a:schemeClr>
+          </a:lnRef>
+          <a:fillRef idx="1">
+            <a:schemeClr val="accent1"/>
+          </a:fillRef>
+          <a:effectRef idx="0">
+            <a:schemeClr val="accent1"/>
+          </a:effectRef>
+          <a:fontRef idx="minor">
+            <a:schemeClr val="lt1"/>
+          </a:fontRef>
+        </p:style>
+        <p:txBody>
+          <a:bodyPr rtlCol="0" anchor="ctr"/>
+          <a:lstStyle/>
+          <a:p>
+            <a:pPr marL="0" marR="0" lvl="0" indent="0" algn="ctr" defTabSz="457200" rtl="0" eaLnBrk="1" fontAlgn="auto" latinLnBrk="0" hangingPunct="1">
+              <a:lnSpc>
+                <a:spcPct val="100000"/>
+              </a:lnSpc>
+              <a:spcBef>
+                <a:spcPts val="0"/>
+              </a:spcBef>
+              <a:spcAft>
+                <a:spcPts val="0"/>
+              </a:spcAft>
+              <a:buClrTx/>
+              <a:buSzTx/>
+              <a:buFontTx/>
+              <a:buNone/>
+              <a:tabLst/>
+              <a:defRPr/>
+            </a:pPr>
+            <a:endParaRPr kumimoji="0" lang="en-US" sz="1800" b="0" i="0" u="none" strike="noStrike" kern="1200" cap="none" spc="0" normalizeH="0" baseline="0" noProof="0">
+              <a:ln>
+                <a:noFill/>
+              </a:ln>
+              <a:solidFill>
+                <a:prstClr val="white"/>
+              </a:solidFill>
+              <a:effectLst/>
+              <a:uLnTx/>
+              <a:uFillTx/>
+              <a:latin typeface="Calibri" panose="020F0502020204030204"/>
+              <a:ea typeface="+mn-ea"/>
+              <a:cs typeface="+mn-cs"/>
+            </a:endParaRPr>
+          </a:p>
+        </p:txBody>
+      </p:sp>
+      <p:sp>
+        <p:nvSpPr>
+          <p:cNvPr id="2" name="Title 1">
+            <a:extLst>
+              <a:ext uri="{FF2B5EF4-FFF2-40B4-BE49-F238E27FC236}">
+                <a16:creationId xmlns:a16="http://schemas.microsoft.com/office/drawing/2014/main" id="{49D51F36-0A60-4142-BA8A-017364B933D6}"/>
+              </a:ext>
+            </a:extLst>
+          </p:cNvPr>
+          <p:cNvSpPr>
+            <a:spLocks noGrp="1"/>
+          </p:cNvSpPr>
+          <p:nvPr>
+            <p:ph type="title"/>
+          </p:nvPr>
+        </p:nvSpPr>
+        <p:spPr>
+          <a:xfrm>
+            <a:off x="762000" y="559678"/>
+            <a:ext cx="3567915" cy="4952492"/>
+          </a:xfrm>
+        </p:spPr>
+        <p:txBody>
+          <a:bodyPr>
+            <a:normAutofit/>
+          </a:bodyPr>
+          <a:lstStyle/>
+          <a:p>
+            <a:r>
+              <a:rPr lang="en-US" dirty="0">
+                <a:solidFill>
+                  <a:schemeClr val="bg1"/>
+                </a:solidFill>
+              </a:rPr>
+              <a:t>UP NEXT:</a:t>
+            </a:r>
+          </a:p>
+        </p:txBody>
+      </p:sp>
+      <p:cxnSp>
+        <p:nvCxnSpPr>
+          <p:cNvPr id="19" name="Straight Connector 18">
+            <a:extLst>
+              <a:ext uri="{FF2B5EF4-FFF2-40B4-BE49-F238E27FC236}">
+                <a16:creationId xmlns:a16="http://schemas.microsoft.com/office/drawing/2014/main" id="{74E776C9-ED67-41B7-B3A3-4DF76EF3ACEE}"/>
+              </a:ext>
+              <a:ext uri="{C183D7F6-B498-43B3-948B-1728B52AA6E4}">
+                <adec:decorative xmlns:adec="http://schemas.microsoft.com/office/drawing/2017/decorative" val="1"/>
+              </a:ext>
+            </a:extLst>
+          </p:cNvPr>
+          <p:cNvCxnSpPr>
+            <a:cxnSpLocks noGrp="1" noRot="1" noChangeAspect="1" noMove="1" noResize="1" noEditPoints="1" noAdjustHandles="1" noChangeArrowheads="1" noChangeShapeType="1"/>
+          </p:cNvCxnSpPr>
+          <p:nvPr>
+            <p:extLst>
+              <p:ext uri="{386F3935-93C4-4BCD-93E2-E3B085C9AB24}">
+                <p16:designElem xmlns:p16="http://schemas.microsoft.com/office/powerpoint/2015/main" val="1"/>
+              </p:ext>
+            </p:extLst>
+          </p:nvPr>
+        </p:nvCxnSpPr>
+        <p:spPr>
+          <a:xfrm>
+            <a:off x="0" y="6199730"/>
+            <a:ext cx="4297680" cy="0"/>
+          </a:xfrm>
+          <a:prstGeom prst="line">
+            <a:avLst/>
+          </a:prstGeom>
+          <a:ln w="25400">
+            <a:solidFill>
+              <a:schemeClr val="bg1"/>
+            </a:solidFill>
+          </a:ln>
+        </p:spPr>
+        <p:style>
+          <a:lnRef idx="1">
+            <a:schemeClr val="accent1"/>
+          </a:lnRef>
+          <a:fillRef idx="0">
+            <a:schemeClr val="accent1"/>
+          </a:fillRef>
+          <a:effectRef idx="0">
+            <a:schemeClr val="accent1"/>
+          </a:effectRef>
+          <a:fontRef idx="minor">
+            <a:schemeClr val="tx1"/>
+          </a:fontRef>
+        </p:style>
+      </p:cxnSp>
+      <p:sp>
+        <p:nvSpPr>
+          <p:cNvPr id="3" name="Rectangle 2">
+            <a:extLst>
+              <a:ext uri="{FF2B5EF4-FFF2-40B4-BE49-F238E27FC236}">
+                <a16:creationId xmlns:a16="http://schemas.microsoft.com/office/drawing/2014/main" id="{04343103-BD67-6D43-A3C1-C2D0C7E24D08}"/>
+              </a:ext>
+            </a:extLst>
+          </p:cNvPr>
+          <p:cNvSpPr/>
+          <p:nvPr/>
+        </p:nvSpPr>
+        <p:spPr>
+          <a:xfrm>
+            <a:off x="5127215" y="2549213"/>
+            <a:ext cx="6587100" cy="523220"/>
+          </a:xfrm>
+          <a:prstGeom prst="rect">
+            <a:avLst/>
+          </a:prstGeom>
+        </p:spPr>
+        <p:txBody>
+          <a:bodyPr wrap="square">
+            <a:spAutoFit/>
+          </a:bodyPr>
+          <a:lstStyle/>
+          <a:p>
+            <a:r>
+              <a:rPr lang="en-ZA" sz="2800" dirty="0">
+                <a:solidFill>
+                  <a:srgbClr val="212121"/>
+                </a:solidFill>
+                <a:latin typeface="Graphik Meetup"/>
+              </a:rPr>
+              <a:t>09:00 - 09:15 - Introductions and Agenda</a:t>
+            </a:r>
+            <a:endParaRPr lang="en-US" sz="2800" dirty="0"/>
+          </a:p>
+        </p:txBody>
+      </p:sp>
+    </p:spTree>
+    <p:extLst>
+      <p:ext uri="{BB962C8B-B14F-4D97-AF65-F5344CB8AC3E}">
+        <p14:creationId xmlns:p14="http://schemas.microsoft.com/office/powerpoint/2010/main" val="2919820840"/>
+      </p:ext>
+    </p:extLst>
+  </p:cSld>
+  <p:clrMapOvr>
+    <a:masterClrMapping/>
+  </p:clrMapOvr>
+</p:sld>
+</file>
+
+<file path=ppt/slides/slide8.xml><?xml version="1.0" encoding="utf-8"?>
+<p:sld xmlns:a="http://schemas.openxmlformats.org/drawingml/2006/main" xmlns:r="http://schemas.openxmlformats.org/officeDocument/2006/relationships" xmlns:p="http://schemas.openxmlformats.org/presentationml/2006/main">
+  <p:cSld>
+    <p:bg>
+      <p:bgPr>
+        <a:solidFill>
+          <a:schemeClr val="bg1"/>
+        </a:solidFill>
+        <a:effectLst/>
+      </p:bgPr>
+    </p:bg>
+    <p:spTree>
+      <p:nvGrpSpPr>
+        <p:cNvPr id="1" name=""/>
+        <p:cNvGrpSpPr/>
+        <p:nvPr/>
+      </p:nvGrpSpPr>
+      <p:grpSpPr>
+        <a:xfrm>
+          <a:off x="0" y="0"/>
+          <a:ext cx="0" cy="0"/>
+          <a:chOff x="0" y="0"/>
+          <a:chExt cx="0" cy="0"/>
+        </a:xfrm>
+      </p:grpSpPr>
+      <p:pic>
+        <p:nvPicPr>
+          <p:cNvPr id="6" name="Picture 5" descr="A close up of a logo&#10;&#10;Description automatically generated">
+            <a:extLst>
+              <a:ext uri="{FF2B5EF4-FFF2-40B4-BE49-F238E27FC236}">
+                <a16:creationId xmlns:a16="http://schemas.microsoft.com/office/drawing/2014/main" id="{73CBE624-5C37-334E-912D-FA83D40084F0}"/>
+              </a:ext>
+            </a:extLst>
+          </p:cNvPr>
+          <p:cNvPicPr>
+            <a:picLocks noChangeAspect="1"/>
+          </p:cNvPicPr>
+          <p:nvPr/>
+        </p:nvPicPr>
+        <p:blipFill>
+          <a:blip r:embed="rId2"/>
+          <a:stretch>
+            <a:fillRect/>
+          </a:stretch>
+        </p:blipFill>
+        <p:spPr>
+          <a:xfrm>
+            <a:off x="4762" y="128587"/>
+            <a:ext cx="12182475" cy="6858000"/>
+          </a:xfrm>
+          <a:prstGeom prst="rect">
+            <a:avLst/>
+          </a:prstGeom>
+        </p:spPr>
+      </p:pic>
+      <p:sp>
+        <p:nvSpPr>
+          <p:cNvPr id="17" name="Rectangle 16">
+            <a:extLst>
+              <a:ext uri="{FF2B5EF4-FFF2-40B4-BE49-F238E27FC236}">
+                <a16:creationId xmlns:a16="http://schemas.microsoft.com/office/drawing/2014/main" id="{68575C10-8187-4AC4-AD72-C754EAFD2867}"/>
+              </a:ext>
+              <a:ext uri="{C183D7F6-B498-43B3-948B-1728B52AA6E4}">
+                <adec:decorative xmlns:adec="http://schemas.microsoft.com/office/drawing/2017/decorative" val="1"/>
+              </a:ext>
+            </a:extLst>
+          </p:cNvPr>
+          <p:cNvSpPr>
+            <a:spLocks noGrp="1" noRot="1" noChangeAspect="1" noMove="1" noResize="1" noEditPoints="1" noAdjustHandles="1" noChangeArrowheads="1" noChangeShapeType="1" noTextEdit="1"/>
+          </p:cNvSpPr>
+          <p:nvPr>
+            <p:extLst>
+              <p:ext uri="{386F3935-93C4-4BCD-93E2-E3B085C9AB24}">
+                <p16:designElem xmlns:p16="http://schemas.microsoft.com/office/powerpoint/2015/main" val="1"/>
+              </p:ext>
+            </p:extLst>
+          </p:nvPr>
+        </p:nvSpPr>
+        <p:spPr>
+          <a:xfrm>
+            <a:off x="-1" y="0"/>
+            <a:ext cx="4654295" cy="6858000"/>
+          </a:xfrm>
+          <a:prstGeom prst="rect">
+            <a:avLst/>
+          </a:prstGeom>
+          <a:solidFill>
+            <a:schemeClr val="tx1"/>
+          </a:solidFill>
+          <a:ln>
+            <a:noFill/>
+          </a:ln>
+        </p:spPr>
+        <p:style>
+          <a:lnRef idx="2">
+            <a:schemeClr val="accent1">
+              <a:shade val="50000"/>
+            </a:schemeClr>
+          </a:lnRef>
+          <a:fillRef idx="1">
+            <a:schemeClr val="accent1"/>
+          </a:fillRef>
+          <a:effectRef idx="0">
+            <a:schemeClr val="accent1"/>
+          </a:effectRef>
+          <a:fontRef idx="minor">
+            <a:schemeClr val="lt1"/>
+          </a:fontRef>
+        </p:style>
+        <p:txBody>
+          <a:bodyPr rtlCol="0" anchor="ctr"/>
+          <a:lstStyle/>
+          <a:p>
+            <a:pPr marL="0" marR="0" lvl="0" indent="0" algn="ctr" defTabSz="457200" rtl="0" eaLnBrk="1" fontAlgn="auto" latinLnBrk="0" hangingPunct="1">
+              <a:lnSpc>
+                <a:spcPct val="100000"/>
+              </a:lnSpc>
+              <a:spcBef>
+                <a:spcPts val="0"/>
+              </a:spcBef>
+              <a:spcAft>
+                <a:spcPts val="0"/>
+              </a:spcAft>
+              <a:buClrTx/>
+              <a:buSzTx/>
+              <a:buFontTx/>
+              <a:buNone/>
+              <a:tabLst/>
+              <a:defRPr/>
+            </a:pPr>
+            <a:endParaRPr kumimoji="0" lang="en-US" sz="1800" b="0" i="0" u="none" strike="noStrike" kern="1200" cap="none" spc="0" normalizeH="0" baseline="0" noProof="0">
+              <a:ln>
+                <a:noFill/>
+              </a:ln>
+              <a:solidFill>
+                <a:prstClr val="white"/>
+              </a:solidFill>
+              <a:effectLst/>
+              <a:uLnTx/>
+              <a:uFillTx/>
+              <a:latin typeface="Calibri" panose="020F0502020204030204"/>
+              <a:ea typeface="+mn-ea"/>
+              <a:cs typeface="+mn-cs"/>
+            </a:endParaRPr>
+          </a:p>
+        </p:txBody>
+      </p:sp>
+      <p:sp>
+        <p:nvSpPr>
+          <p:cNvPr id="2" name="Title 1">
+            <a:extLst>
+              <a:ext uri="{FF2B5EF4-FFF2-40B4-BE49-F238E27FC236}">
+                <a16:creationId xmlns:a16="http://schemas.microsoft.com/office/drawing/2014/main" id="{49D51F36-0A60-4142-BA8A-017364B933D6}"/>
+              </a:ext>
+            </a:extLst>
+          </p:cNvPr>
+          <p:cNvSpPr>
+            <a:spLocks noGrp="1"/>
+          </p:cNvSpPr>
+          <p:nvPr>
+            <p:ph type="title"/>
+          </p:nvPr>
+        </p:nvSpPr>
+        <p:spPr>
+          <a:xfrm>
+            <a:off x="762000" y="559678"/>
+            <a:ext cx="3567915" cy="4952492"/>
+          </a:xfrm>
+        </p:spPr>
+        <p:txBody>
+          <a:bodyPr>
+            <a:normAutofit/>
+          </a:bodyPr>
+          <a:lstStyle/>
+          <a:p>
+            <a:r>
+              <a:rPr lang="en-US" dirty="0">
+                <a:solidFill>
+                  <a:schemeClr val="bg1"/>
+                </a:solidFill>
+              </a:rPr>
+              <a:t>UP NEXT:</a:t>
+            </a:r>
+          </a:p>
+        </p:txBody>
+      </p:sp>
+      <p:cxnSp>
+        <p:nvCxnSpPr>
+          <p:cNvPr id="19" name="Straight Connector 18">
+            <a:extLst>
+              <a:ext uri="{FF2B5EF4-FFF2-40B4-BE49-F238E27FC236}">
+                <a16:creationId xmlns:a16="http://schemas.microsoft.com/office/drawing/2014/main" id="{74E776C9-ED67-41B7-B3A3-4DF76EF3ACEE}"/>
+              </a:ext>
+              <a:ext uri="{C183D7F6-B498-43B3-948B-1728B52AA6E4}">
+                <adec:decorative xmlns:adec="http://schemas.microsoft.com/office/drawing/2017/decorative" val="1"/>
+              </a:ext>
+            </a:extLst>
+          </p:cNvPr>
+          <p:cNvCxnSpPr>
+            <a:cxnSpLocks noGrp="1" noRot="1" noChangeAspect="1" noMove="1" noResize="1" noEditPoints="1" noAdjustHandles="1" noChangeArrowheads="1" noChangeShapeType="1"/>
+          </p:cNvCxnSpPr>
+          <p:nvPr>
+            <p:extLst>
+              <p:ext uri="{386F3935-93C4-4BCD-93E2-E3B085C9AB24}">
+                <p16:designElem xmlns:p16="http://schemas.microsoft.com/office/powerpoint/2015/main" val="1"/>
+              </p:ext>
+            </p:extLst>
+          </p:nvPr>
+        </p:nvCxnSpPr>
+        <p:spPr>
+          <a:xfrm>
+            <a:off x="0" y="6199730"/>
+            <a:ext cx="4297680" cy="0"/>
+          </a:xfrm>
+          <a:prstGeom prst="line">
+            <a:avLst/>
+          </a:prstGeom>
+          <a:ln w="25400">
+            <a:solidFill>
+              <a:schemeClr val="bg1"/>
+            </a:solidFill>
+          </a:ln>
+        </p:spPr>
+        <p:style>
+          <a:lnRef idx="1">
+            <a:schemeClr val="accent1"/>
+          </a:lnRef>
+          <a:fillRef idx="0">
+            <a:schemeClr val="accent1"/>
+          </a:fillRef>
+          <a:effectRef idx="0">
+            <a:schemeClr val="accent1"/>
+          </a:effectRef>
+          <a:fontRef idx="minor">
+            <a:schemeClr val="tx1"/>
+          </a:fontRef>
+        </p:style>
+      </p:cxnSp>
+      <p:sp>
+        <p:nvSpPr>
+          <p:cNvPr id="3" name="Rectangle 2">
+            <a:extLst>
+              <a:ext uri="{FF2B5EF4-FFF2-40B4-BE49-F238E27FC236}">
+                <a16:creationId xmlns:a16="http://schemas.microsoft.com/office/drawing/2014/main" id="{04343103-BD67-6D43-A3C1-C2D0C7E24D08}"/>
+              </a:ext>
+            </a:extLst>
+          </p:cNvPr>
+          <p:cNvSpPr/>
+          <p:nvPr/>
+        </p:nvSpPr>
+        <p:spPr>
+          <a:xfrm>
+            <a:off x="5654566" y="1166842"/>
+            <a:ext cx="6096000" cy="2031325"/>
+          </a:xfrm>
+          <a:prstGeom prst="rect">
+            <a:avLst/>
+          </a:prstGeom>
+        </p:spPr>
+        <p:txBody>
+          <a:bodyPr>
+            <a:spAutoFit/>
+          </a:bodyPr>
+          <a:lstStyle/>
+          <a:p>
+            <a:r>
+              <a:rPr lang="en-ZA" dirty="0">
+                <a:solidFill>
+                  <a:srgbClr val="212121"/>
+                </a:solidFill>
+                <a:latin typeface="Graphik Meetup"/>
+              </a:rPr>
+              <a:t>08:45 - 08:55 – Teams Dial in and Coffee at your OWN HOUSE</a:t>
+            </a:r>
+            <a:br>
+              <a:rPr lang="en-ZA" dirty="0"/>
+            </a:br>
+            <a:br>
+              <a:rPr lang="en-ZA" dirty="0"/>
+            </a:br>
+            <a:r>
+              <a:rPr lang="en-ZA" dirty="0">
+                <a:solidFill>
+                  <a:srgbClr val="212121"/>
+                </a:solidFill>
+                <a:latin typeface="Graphik Meetup"/>
+              </a:rPr>
+              <a:t>09:00 - 09:15 - Introductions and Agenda</a:t>
+            </a:r>
+            <a:br>
+              <a:rPr lang="en-ZA" dirty="0"/>
+            </a:br>
+            <a:br>
+              <a:rPr lang="en-ZA" dirty="0"/>
+            </a:br>
+            <a:r>
+              <a:rPr lang="en-ZA" dirty="0">
+                <a:solidFill>
+                  <a:srgbClr val="212121"/>
+                </a:solidFill>
+                <a:latin typeface="Graphik Meetup"/>
+              </a:rPr>
+              <a:t>09:25 - 10:20- </a:t>
+            </a:r>
+            <a:r>
+              <a:rPr lang="en-ZA" dirty="0"/>
+              <a:t>Introducing Azure DevOps</a:t>
+            </a:r>
+          </a:p>
+          <a:p>
+            <a:r>
+              <a:rPr lang="en-ZA" dirty="0">
+                <a:solidFill>
+                  <a:srgbClr val="212121"/>
+                </a:solidFill>
+                <a:latin typeface="Graphik Meetup"/>
+              </a:rPr>
+              <a:t>Warren and </a:t>
+            </a:r>
+            <a:r>
+              <a:rPr lang="en-ZA" dirty="0" err="1">
+                <a:solidFill>
+                  <a:srgbClr val="212121"/>
+                </a:solidFill>
+                <a:latin typeface="Graphik Meetup"/>
+              </a:rPr>
+              <a:t>Niel</a:t>
+            </a:r>
+            <a:br>
+              <a:rPr lang="en-ZA" dirty="0"/>
+            </a:br>
+            <a:endParaRPr lang="en-US" dirty="0"/>
+          </a:p>
+        </p:txBody>
+      </p:sp>
+    </p:spTree>
+    <p:extLst>
+      <p:ext uri="{BB962C8B-B14F-4D97-AF65-F5344CB8AC3E}">
+        <p14:creationId xmlns:p14="http://schemas.microsoft.com/office/powerpoint/2010/main" val="3150562529"/>
       </p:ext>
     </p:extLst>
   </p:cSld>

</xml_diff>